<commit_message>
used weights to adjust for nonresponse bias
</commit_message>
<xml_diff>
--- a/project ver.3/Presentation.pptx
+++ b/project ver.3/Presentation.pptx
@@ -8,10 +8,6 @@
     <p:sldId id="256" r:id="rId2"/>
     <p:sldId id="262" r:id="rId3"/>
     <p:sldId id="267" r:id="rId4"/>
-    <p:sldId id="261" r:id="rId5"/>
-    <p:sldId id="265" r:id="rId6"/>
-    <p:sldId id="263" r:id="rId7"/>
-    <p:sldId id="264" r:id="rId8"/>
   </p:sldIdLst>
   <p:sldSz cx="9144000" cy="6858000" type="screen4x3"/>
   <p:notesSz cx="6858000" cy="9144000"/>
@@ -7685,55 +7681,78 @@
           </a:p>
         </p:txBody>
       </p:sp>
-      <p:sp>
-        <p:nvSpPr>
-          <p:cNvPr id="4" name="Rectangle 3"/>
-          <p:cNvSpPr/>
+      <p:pic>
+        <p:nvPicPr>
+          <p:cNvPr id="5" name="Picture 4" descr="Untitled.png"/>
+          <p:cNvPicPr>
+            <a:picLocks noChangeAspect="1"/>
+          </p:cNvPicPr>
           <p:nvPr/>
-        </p:nvSpPr>
+        </p:nvPicPr>
+        <p:blipFill>
+          <a:blip r:embed="rId2">
+            <a:extLst>
+              <a:ext uri="{28A0092B-C50C-407E-A947-70E740481C1C}">
+                <a14:useLocalDpi xmlns:a14="http://schemas.microsoft.com/office/drawing/2010/main" val="0"/>
+              </a:ext>
+            </a:extLst>
+          </a:blip>
+          <a:stretch>
+            <a:fillRect/>
+          </a:stretch>
+        </p:blipFill>
         <p:spPr>
           <a:xfrm>
-            <a:off x="1792127" y="3519973"/>
-            <a:ext cx="4572000" cy="1477328"/>
+            <a:off x="2645749" y="3575756"/>
+            <a:ext cx="3252800" cy="1792438"/>
           </a:xfrm>
           <a:prstGeom prst="rect">
             <a:avLst/>
           </a:prstGeom>
         </p:spPr>
-        <p:txBody>
-          <a:bodyPr>
+      </p:pic>
+      <p:sp>
+        <p:nvSpPr>
+          <p:cNvPr id="6" name="TextBox 5"/>
+          <p:cNvSpPr txBox="1"/>
+          <p:nvPr/>
+        </p:nvSpPr>
+        <p:spPr>
+          <a:xfrm>
+            <a:off x="2645749" y="5368194"/>
+            <a:ext cx="3523846" cy="276999"/>
+          </a:xfrm>
+          <a:prstGeom prst="rect">
+            <a:avLst/>
+          </a:prstGeom>
+          <a:noFill/>
+        </p:spPr>
+        <p:txBody>
+          <a:bodyPr wrap="none" rtlCol="0">
             <a:spAutoFit/>
           </a:bodyPr>
           <a:lstStyle/>
           <a:p>
             <a:r>
-              <a:rPr lang="en-US" dirty="0"/>
-              <a:t>total survey error = coverage error + nonresponse error + measurement error</a:t>
-            </a:r>
-          </a:p>
-          <a:p>
-            <a:r>
-              <a:rPr lang="en-US" dirty="0"/>
-              <a:t>+ processing error + sampling </a:t>
-            </a:r>
-            <a:r>
-              <a:rPr lang="en-US" dirty="0" smtClean="0"/>
-              <a:t>error</a:t>
-            </a:r>
-          </a:p>
-          <a:p>
-            <a:endParaRPr lang="en-US" dirty="0" smtClean="0"/>
-          </a:p>
-          <a:p>
-            <a:r>
-              <a:rPr lang="en-US" dirty="0"/>
-              <a:t>Andersen et al., </a:t>
-            </a:r>
-            <a:r>
-              <a:rPr lang="en-US" dirty="0" smtClean="0"/>
-              <a:t>1979</a:t>
-            </a:r>
-            <a:endParaRPr lang="en-US" dirty="0"/>
+              <a:rPr lang="en-US" sz="1200" dirty="0"/>
+              <a:t>https://</a:t>
+            </a:r>
+            <a:r>
+              <a:rPr lang="en-US" sz="1200" dirty="0" err="1"/>
+              <a:t>www.youtube.com</a:t>
+            </a:r>
+            <a:r>
+              <a:rPr lang="en-US" sz="1200" dirty="0"/>
+              <a:t>/</a:t>
+            </a:r>
+            <a:r>
+              <a:rPr lang="en-US" sz="1200" dirty="0" err="1"/>
+              <a:t>watch?v</a:t>
+            </a:r>
+            <a:r>
+              <a:rPr lang="en-US" sz="1200" dirty="0"/>
+              <a:t>=6v148z4ISIM</a:t>
+            </a:r>
           </a:p>
         </p:txBody>
       </p:sp>
@@ -7834,7 +7853,23 @@
                   <a:schemeClr val="tx1"/>
                 </a:solidFill>
               </a:rPr>
-              <a:t>“Participation is voluntary” (Wang, 2014)</a:t>
+              <a:t>“Participation is voluntary</a:t>
+            </a:r>
+            <a:r>
+              <a:rPr lang="mr-IN" dirty="0" smtClean="0">
+                <a:solidFill>
+                  <a:schemeClr val="tx1"/>
+                </a:solidFill>
+              </a:rPr>
+              <a:t>…</a:t>
+            </a:r>
+            <a:r>
+              <a:rPr lang="en-US" dirty="0" smtClean="0">
+                <a:solidFill>
+                  <a:schemeClr val="tx1"/>
+                </a:solidFill>
+              </a:rPr>
+              <a:t>” (Wang, 2014)</a:t>
             </a:r>
             <a:endParaRPr lang="en-US" dirty="0">
               <a:solidFill>
@@ -7882,808 +7917,6 @@
     <p:extLst>
       <p:ext uri="{BB962C8B-B14F-4D97-AF65-F5344CB8AC3E}">
         <p14:creationId xmlns:p14="http://schemas.microsoft.com/office/powerpoint/2010/main" val="2158142886"/>
-      </p:ext>
-    </p:extLst>
-  </p:cSld>
-  <p:clrMapOvr>
-    <a:masterClrMapping/>
-  </p:clrMapOvr>
-</p:sld>
-</file>
-
-<file path=ppt/slides/slide4.xml><?xml version="1.0" encoding="utf-8"?>
-<p:sld xmlns:a="http://schemas.openxmlformats.org/drawingml/2006/main" xmlns:r="http://schemas.openxmlformats.org/officeDocument/2006/relationships" xmlns:p="http://schemas.openxmlformats.org/presentationml/2006/main">
-  <p:cSld>
-    <p:spTree>
-      <p:nvGrpSpPr>
-        <p:cNvPr id="1" name=""/>
-        <p:cNvGrpSpPr/>
-        <p:nvPr/>
-      </p:nvGrpSpPr>
-      <p:grpSpPr>
-        <a:xfrm>
-          <a:off x="0" y="0"/>
-          <a:ext cx="0" cy="0"/>
-          <a:chOff x="0" y="0"/>
-          <a:chExt cx="0" cy="0"/>
-        </a:xfrm>
-      </p:grpSpPr>
-      <p:sp>
-        <p:nvSpPr>
-          <p:cNvPr id="2" name="Title 1"/>
-          <p:cNvSpPr>
-            <a:spLocks noGrp="1"/>
-          </p:cNvSpPr>
-          <p:nvPr>
-            <p:ph type="title"/>
-          </p:nvPr>
-        </p:nvSpPr>
-        <p:spPr/>
-        <p:txBody>
-          <a:bodyPr>
-            <a:normAutofit/>
-          </a:bodyPr>
-          <a:lstStyle/>
-          <a:p>
-            <a:r>
-              <a:rPr lang="en-US" sz="4000" dirty="0" smtClean="0"/>
-              <a:t>Data analysis: trash in </a:t>
-            </a:r>
-            <a:r>
-              <a:rPr lang="en-US" sz="4000" dirty="0"/>
-              <a:t>t</a:t>
-            </a:r>
-            <a:r>
-              <a:rPr lang="en-US" sz="4000" dirty="0" smtClean="0"/>
-              <a:t>rash out</a:t>
-            </a:r>
-            <a:endParaRPr lang="en-US" sz="4000" dirty="0"/>
-          </a:p>
-        </p:txBody>
-      </p:sp>
-      <p:sp>
-        <p:nvSpPr>
-          <p:cNvPr id="3" name="Content Placeholder 2"/>
-          <p:cNvSpPr>
-            <a:spLocks noGrp="1"/>
-          </p:cNvSpPr>
-          <p:nvPr>
-            <p:ph idx="1"/>
-          </p:nvPr>
-        </p:nvSpPr>
-        <p:spPr>
-          <a:xfrm>
-            <a:off x="749746" y="2051294"/>
-            <a:ext cx="7495729" cy="1005852"/>
-          </a:xfrm>
-        </p:spPr>
-        <p:txBody>
-          <a:bodyPr>
-            <a:normAutofit/>
-          </a:bodyPr>
-          <a:lstStyle/>
-          <a:p>
-            <a:r>
-              <a:rPr lang="en-US" dirty="0" smtClean="0"/>
-              <a:t>Acquiring a </a:t>
-            </a:r>
-            <a:r>
-              <a:rPr lang="en-US" dirty="0" smtClean="0">
-                <a:solidFill>
-                  <a:srgbClr val="FF0000"/>
-                </a:solidFill>
-              </a:rPr>
-              <a:t>good</a:t>
-            </a:r>
-            <a:r>
-              <a:rPr lang="en-US" dirty="0" smtClean="0"/>
-              <a:t> </a:t>
-            </a:r>
-            <a:r>
-              <a:rPr lang="en-US" dirty="0" smtClean="0">
-                <a:solidFill>
-                  <a:srgbClr val="FF0000"/>
-                </a:solidFill>
-              </a:rPr>
-              <a:t>dataset</a:t>
-            </a:r>
-            <a:r>
-              <a:rPr lang="en-US" dirty="0" smtClean="0"/>
-              <a:t> is as important as analyzing them!!</a:t>
-            </a:r>
-          </a:p>
-        </p:txBody>
-      </p:sp>
-      <p:sp>
-        <p:nvSpPr>
-          <p:cNvPr id="9" name="Content Placeholder 2"/>
-          <p:cNvSpPr txBox="1">
-            <a:spLocks/>
-          </p:cNvSpPr>
-          <p:nvPr/>
-        </p:nvSpPr>
-        <p:spPr>
-          <a:xfrm>
-            <a:off x="1469861" y="2880700"/>
-            <a:ext cx="6055824" cy="1093444"/>
-          </a:xfrm>
-          <a:prstGeom prst="rect">
-            <a:avLst/>
-          </a:prstGeom>
-        </p:spPr>
-        <p:txBody>
-          <a:bodyPr vert="horz" lIns="91440" tIns="45720" rIns="91440" bIns="45720" rtlCol="0">
-            <a:normAutofit/>
-          </a:bodyPr>
-          <a:lstStyle>
-            <a:lvl1pPr marL="342900" indent="-342900" algn="l" defTabSz="914400" rtl="0" eaLnBrk="1" latinLnBrk="0" hangingPunct="1">
-              <a:spcBef>
-                <a:spcPts val="2000"/>
-              </a:spcBef>
-              <a:buClr>
-                <a:schemeClr val="tx1">
-                  <a:lumMod val="75000"/>
-                  <a:lumOff val="25000"/>
-                </a:schemeClr>
-              </a:buClr>
-              <a:buFont typeface="Arial" pitchFamily="34" charset="0"/>
-              <a:buChar char="•"/>
-              <a:defRPr sz="2400" kern="1200">
-                <a:solidFill>
-                  <a:schemeClr val="tx1">
-                    <a:lumMod val="75000"/>
-                    <a:lumOff val="25000"/>
-                  </a:schemeClr>
-                </a:solidFill>
-                <a:latin typeface="+mn-lt"/>
-                <a:ea typeface="+mn-ea"/>
-                <a:cs typeface="+mn-cs"/>
-              </a:defRPr>
-            </a:lvl1pPr>
-            <a:lvl2pPr marL="579438" indent="-228600" algn="l" defTabSz="914400" rtl="0" eaLnBrk="1" latinLnBrk="0" hangingPunct="1">
-              <a:spcBef>
-                <a:spcPts val="600"/>
-              </a:spcBef>
-              <a:buClr>
-                <a:schemeClr val="bg2">
-                  <a:lumMod val="60000"/>
-                  <a:lumOff val="40000"/>
-                </a:schemeClr>
-              </a:buClr>
-              <a:buFont typeface="Arial" pitchFamily="34" charset="0"/>
-              <a:buChar char="•"/>
-              <a:defRPr sz="2200" kern="1200">
-                <a:solidFill>
-                  <a:schemeClr val="tx1">
-                    <a:lumMod val="75000"/>
-                    <a:lumOff val="25000"/>
-                  </a:schemeClr>
-                </a:solidFill>
-                <a:latin typeface="+mn-lt"/>
-                <a:ea typeface="+mn-ea"/>
-                <a:cs typeface="+mn-cs"/>
-              </a:defRPr>
-            </a:lvl2pPr>
-            <a:lvl3pPr marL="808038" indent="-228600" algn="l" defTabSz="914400" rtl="0" eaLnBrk="1" latinLnBrk="0" hangingPunct="1">
-              <a:spcBef>
-                <a:spcPts val="600"/>
-              </a:spcBef>
-              <a:buClr>
-                <a:schemeClr val="tx1">
-                  <a:lumMod val="75000"/>
-                  <a:lumOff val="25000"/>
-                </a:schemeClr>
-              </a:buClr>
-              <a:buFont typeface="Arial" pitchFamily="34" charset="0"/>
-              <a:buChar char="•"/>
-              <a:defRPr sz="2000" kern="1200">
-                <a:solidFill>
-                  <a:schemeClr val="tx1">
-                    <a:lumMod val="75000"/>
-                    <a:lumOff val="25000"/>
-                  </a:schemeClr>
-                </a:solidFill>
-                <a:latin typeface="+mn-lt"/>
-                <a:ea typeface="+mn-ea"/>
-                <a:cs typeface="+mn-cs"/>
-              </a:defRPr>
-            </a:lvl3pPr>
-            <a:lvl4pPr marL="1036638" indent="-228600" algn="l" defTabSz="914400" rtl="0" eaLnBrk="1" latinLnBrk="0" hangingPunct="1">
-              <a:spcBef>
-                <a:spcPts val="600"/>
-              </a:spcBef>
-              <a:buClr>
-                <a:schemeClr val="bg2">
-                  <a:lumMod val="60000"/>
-                  <a:lumOff val="40000"/>
-                </a:schemeClr>
-              </a:buClr>
-              <a:buFont typeface="Arial" pitchFamily="34" charset="0"/>
-              <a:buChar char="•"/>
-              <a:defRPr sz="1800" kern="1200">
-                <a:solidFill>
-                  <a:schemeClr val="tx1">
-                    <a:lumMod val="75000"/>
-                    <a:lumOff val="25000"/>
-                  </a:schemeClr>
-                </a:solidFill>
-                <a:latin typeface="+mn-lt"/>
-                <a:ea typeface="+mn-ea"/>
-                <a:cs typeface="+mn-cs"/>
-              </a:defRPr>
-            </a:lvl4pPr>
-            <a:lvl5pPr marL="1265238" indent="-228600" algn="l" defTabSz="914400" rtl="0" eaLnBrk="1" latinLnBrk="0" hangingPunct="1">
-              <a:spcBef>
-                <a:spcPts val="600"/>
-              </a:spcBef>
-              <a:buClr>
-                <a:schemeClr val="tx1">
-                  <a:lumMod val="75000"/>
-                  <a:lumOff val="25000"/>
-                </a:schemeClr>
-              </a:buClr>
-              <a:buFont typeface="Arial" pitchFamily="34" charset="0"/>
-              <a:buChar char="•"/>
-              <a:defRPr sz="1800" kern="1200">
-                <a:solidFill>
-                  <a:schemeClr val="tx1">
-                    <a:lumMod val="75000"/>
-                    <a:lumOff val="25000"/>
-                  </a:schemeClr>
-                </a:solidFill>
-                <a:latin typeface="+mn-lt"/>
-                <a:ea typeface="+mn-ea"/>
-                <a:cs typeface="+mn-cs"/>
-              </a:defRPr>
-            </a:lvl5pPr>
-            <a:lvl6pPr marL="1485900" indent="-228600" algn="l" defTabSz="914400" rtl="0" eaLnBrk="1" latinLnBrk="0" hangingPunct="1">
-              <a:spcBef>
-                <a:spcPct val="20000"/>
-              </a:spcBef>
-              <a:buClr>
-                <a:schemeClr val="bg2">
-                  <a:lumMod val="60000"/>
-                  <a:lumOff val="40000"/>
-                </a:schemeClr>
-              </a:buClr>
-              <a:buFont typeface="Arial" pitchFamily="34" charset="0"/>
-              <a:buChar char="•"/>
-              <a:defRPr lang="en-US" sz="1800" kern="1200" dirty="0" smtClean="0">
-                <a:solidFill>
-                  <a:schemeClr val="tx1">
-                    <a:lumMod val="75000"/>
-                    <a:lumOff val="25000"/>
-                  </a:schemeClr>
-                </a:solidFill>
-                <a:latin typeface="+mn-lt"/>
-                <a:ea typeface="+mn-ea"/>
-                <a:cs typeface="+mn-cs"/>
-              </a:defRPr>
-            </a:lvl6pPr>
-            <a:lvl7pPr marL="1712913" indent="-228600" algn="l" defTabSz="914400" rtl="0" eaLnBrk="1" latinLnBrk="0" hangingPunct="1">
-              <a:spcBef>
-                <a:spcPct val="20000"/>
-              </a:spcBef>
-              <a:buClr>
-                <a:schemeClr val="tx1">
-                  <a:lumMod val="75000"/>
-                  <a:lumOff val="25000"/>
-                </a:schemeClr>
-              </a:buClr>
-              <a:buFont typeface="Arial" pitchFamily="34" charset="0"/>
-              <a:buChar char="•"/>
-              <a:defRPr lang="en-US" sz="1800" kern="1200" dirty="0" smtClean="0">
-                <a:solidFill>
-                  <a:schemeClr val="tx1">
-                    <a:lumMod val="75000"/>
-                    <a:lumOff val="25000"/>
-                  </a:schemeClr>
-                </a:solidFill>
-                <a:latin typeface="+mn-lt"/>
-                <a:ea typeface="+mn-ea"/>
-                <a:cs typeface="+mn-cs"/>
-              </a:defRPr>
-            </a:lvl7pPr>
-            <a:lvl8pPr marL="1947863" indent="-228600" algn="l" defTabSz="914400" rtl="0" eaLnBrk="1" latinLnBrk="0" hangingPunct="1">
-              <a:spcBef>
-                <a:spcPct val="20000"/>
-              </a:spcBef>
-              <a:buClr>
-                <a:schemeClr val="bg2">
-                  <a:lumMod val="60000"/>
-                  <a:lumOff val="40000"/>
-                </a:schemeClr>
-              </a:buClr>
-              <a:buFont typeface="Arial" pitchFamily="34" charset="0"/>
-              <a:buChar char="•"/>
-              <a:defRPr lang="en-US" sz="1800" kern="1200" dirty="0" smtClean="0">
-                <a:solidFill>
-                  <a:schemeClr val="tx1">
-                    <a:lumMod val="75000"/>
-                    <a:lumOff val="25000"/>
-                  </a:schemeClr>
-                </a:solidFill>
-                <a:latin typeface="+mn-lt"/>
-                <a:ea typeface="+mn-ea"/>
-                <a:cs typeface="+mn-cs"/>
-              </a:defRPr>
-            </a:lvl8pPr>
-            <a:lvl9pPr marL="2174875" indent="-228600" algn="l" defTabSz="914400" rtl="0" eaLnBrk="1" latinLnBrk="0" hangingPunct="1">
-              <a:spcBef>
-                <a:spcPct val="20000"/>
-              </a:spcBef>
-              <a:buClr>
-                <a:schemeClr val="tx1">
-                  <a:lumMod val="75000"/>
-                  <a:lumOff val="25000"/>
-                </a:schemeClr>
-              </a:buClr>
-              <a:buFont typeface="Arial" pitchFamily="34" charset="0"/>
-              <a:buChar char="•"/>
-              <a:defRPr lang="en-US" sz="1800" kern="1200" dirty="0">
-                <a:solidFill>
-                  <a:schemeClr val="tx1">
-                    <a:lumMod val="75000"/>
-                    <a:lumOff val="25000"/>
-                  </a:schemeClr>
-                </a:solidFill>
-                <a:latin typeface="+mn-lt"/>
-                <a:ea typeface="+mn-ea"/>
-                <a:cs typeface="+mn-cs"/>
-              </a:defRPr>
-            </a:lvl9pPr>
-          </a:lstStyle>
-          <a:p>
-            <a:pPr marL="0" indent="0">
-              <a:buNone/>
-            </a:pPr>
-            <a:r>
-              <a:rPr lang="en-US" dirty="0" smtClean="0"/>
-              <a:t>i.e. Must account for sampling errors and various forms of </a:t>
-            </a:r>
-            <a:r>
-              <a:rPr lang="en-US" b="1" dirty="0" smtClean="0">
-                <a:solidFill>
-                  <a:schemeClr val="tx1">
-                    <a:lumMod val="95000"/>
-                    <a:lumOff val="5000"/>
-                  </a:schemeClr>
-                </a:solidFill>
-              </a:rPr>
-              <a:t>biases. </a:t>
-            </a:r>
-            <a:endParaRPr lang="en-US" b="1" dirty="0">
-              <a:solidFill>
-                <a:srgbClr val="FF0000"/>
-              </a:solidFill>
-            </a:endParaRPr>
-          </a:p>
-        </p:txBody>
-      </p:sp>
-      <p:pic>
-        <p:nvPicPr>
-          <p:cNvPr id="6" name="Picture 5" descr="Untitled.png"/>
-          <p:cNvPicPr>
-            <a:picLocks noChangeAspect="1"/>
-          </p:cNvPicPr>
-          <p:nvPr/>
-        </p:nvPicPr>
-        <p:blipFill>
-          <a:blip r:embed="rId2">
-            <a:extLst>
-              <a:ext uri="{28A0092B-C50C-407E-A947-70E740481C1C}">
-                <a14:useLocalDpi xmlns:a14="http://schemas.microsoft.com/office/drawing/2010/main" val="0"/>
-              </a:ext>
-            </a:extLst>
-          </a:blip>
-          <a:stretch>
-            <a:fillRect/>
-          </a:stretch>
-        </p:blipFill>
-        <p:spPr>
-          <a:xfrm>
-            <a:off x="2434087" y="4289114"/>
-            <a:ext cx="3252800" cy="1792438"/>
-          </a:xfrm>
-          <a:prstGeom prst="rect">
-            <a:avLst/>
-          </a:prstGeom>
-        </p:spPr>
-      </p:pic>
-      <p:sp>
-        <p:nvSpPr>
-          <p:cNvPr id="4" name="TextBox 3"/>
-          <p:cNvSpPr txBox="1"/>
-          <p:nvPr/>
-        </p:nvSpPr>
-        <p:spPr>
-          <a:xfrm>
-            <a:off x="2645749" y="6038415"/>
-            <a:ext cx="3523846" cy="276999"/>
-          </a:xfrm>
-          <a:prstGeom prst="rect">
-            <a:avLst/>
-          </a:prstGeom>
-          <a:noFill/>
-        </p:spPr>
-        <p:txBody>
-          <a:bodyPr wrap="none" rtlCol="0">
-            <a:spAutoFit/>
-          </a:bodyPr>
-          <a:lstStyle/>
-          <a:p>
-            <a:r>
-              <a:rPr lang="en-US" sz="1200" dirty="0"/>
-              <a:t>https://</a:t>
-            </a:r>
-            <a:r>
-              <a:rPr lang="en-US" sz="1200" dirty="0" err="1"/>
-              <a:t>www.youtube.com</a:t>
-            </a:r>
-            <a:r>
-              <a:rPr lang="en-US" sz="1200" dirty="0"/>
-              <a:t>/</a:t>
-            </a:r>
-            <a:r>
-              <a:rPr lang="en-US" sz="1200" dirty="0" err="1"/>
-              <a:t>watch?v</a:t>
-            </a:r>
-            <a:r>
-              <a:rPr lang="en-US" sz="1200" dirty="0"/>
-              <a:t>=6v148z4ISIM</a:t>
-            </a:r>
-          </a:p>
-        </p:txBody>
-      </p:sp>
-    </p:spTree>
-    <p:extLst>
-      <p:ext uri="{BB962C8B-B14F-4D97-AF65-F5344CB8AC3E}">
-        <p14:creationId xmlns:p14="http://schemas.microsoft.com/office/powerpoint/2010/main" val="122223685"/>
-      </p:ext>
-    </p:extLst>
-  </p:cSld>
-  <p:clrMapOvr>
-    <a:masterClrMapping/>
-  </p:clrMapOvr>
-  <p:timing>
-    <p:tnLst>
-      <p:par>
-        <p:cTn xmlns:p14="http://schemas.microsoft.com/office/powerpoint/2010/main" id="1" dur="indefinite" restart="never" nodeType="tmRoot"/>
-      </p:par>
-    </p:tnLst>
-  </p:timing>
-</p:sld>
-</file>
-
-<file path=ppt/slides/slide5.xml><?xml version="1.0" encoding="utf-8"?>
-<p:sld xmlns:a="http://schemas.openxmlformats.org/drawingml/2006/main" xmlns:r="http://schemas.openxmlformats.org/officeDocument/2006/relationships" xmlns:p="http://schemas.openxmlformats.org/presentationml/2006/main">
-  <p:cSld>
-    <p:spTree>
-      <p:nvGrpSpPr>
-        <p:cNvPr id="1" name=""/>
-        <p:cNvGrpSpPr/>
-        <p:nvPr/>
-      </p:nvGrpSpPr>
-      <p:grpSpPr>
-        <a:xfrm>
-          <a:off x="0" y="0"/>
-          <a:ext cx="0" cy="0"/>
-          <a:chOff x="0" y="0"/>
-          <a:chExt cx="0" cy="0"/>
-        </a:xfrm>
-      </p:grpSpPr>
-      <p:sp>
-        <p:nvSpPr>
-          <p:cNvPr id="2" name="Title 1"/>
-          <p:cNvSpPr>
-            <a:spLocks noGrp="1"/>
-          </p:cNvSpPr>
-          <p:nvPr>
-            <p:ph type="title"/>
-          </p:nvPr>
-        </p:nvSpPr>
-        <p:spPr/>
-        <p:txBody>
-          <a:bodyPr>
-            <a:normAutofit/>
-          </a:bodyPr>
-          <a:lstStyle/>
-          <a:p>
-            <a:r>
-              <a:rPr lang="en-US" sz="3500" dirty="0" smtClean="0"/>
-              <a:t>Identify and adjust for (unit) nonresponse bias</a:t>
-            </a:r>
-            <a:endParaRPr lang="en-US" sz="3500" dirty="0"/>
-          </a:p>
-        </p:txBody>
-      </p:sp>
-      <p:sp>
-        <p:nvSpPr>
-          <p:cNvPr id="3" name="Content Placeholder 2"/>
-          <p:cNvSpPr>
-            <a:spLocks noGrp="1"/>
-          </p:cNvSpPr>
-          <p:nvPr>
-            <p:ph idx="1"/>
-          </p:nvPr>
-        </p:nvSpPr>
-        <p:spPr/>
-        <p:txBody>
-          <a:bodyPr/>
-          <a:lstStyle/>
-          <a:p>
-            <a:r>
-              <a:rPr lang="en-US" dirty="0" smtClean="0"/>
-              <a:t>Identify:</a:t>
-            </a:r>
-          </a:p>
-          <a:p>
-            <a:pPr lvl="1"/>
-            <a:r>
-              <a:rPr lang="en-US" dirty="0" smtClean="0"/>
-              <a:t>Compare initial and late response</a:t>
-            </a:r>
-          </a:p>
-          <a:p>
-            <a:pPr lvl="1"/>
-            <a:r>
-              <a:rPr lang="en-US" dirty="0" smtClean="0">
-                <a:solidFill>
-                  <a:srgbClr val="FF0000"/>
-                </a:solidFill>
-              </a:rPr>
-              <a:t>Compare survey results to known population parameter</a:t>
-            </a:r>
-          </a:p>
-          <a:p>
-            <a:pPr lvl="1"/>
-            <a:r>
-              <a:rPr lang="en-US" dirty="0" smtClean="0"/>
-              <a:t>Using known data	base variable to identify bias</a:t>
-            </a:r>
-          </a:p>
-          <a:p>
-            <a:pPr marL="350838" lvl="1" indent="0">
-              <a:buNone/>
-            </a:pPr>
-            <a:endParaRPr lang="en-US" dirty="0"/>
-          </a:p>
-          <a:p>
-            <a:r>
-              <a:rPr lang="en-US" dirty="0" smtClean="0"/>
-              <a:t>Adjust:</a:t>
-            </a:r>
-          </a:p>
-          <a:p>
-            <a:pPr lvl="1"/>
-            <a:r>
-              <a:rPr lang="en-US" dirty="0" smtClean="0">
-                <a:solidFill>
-                  <a:srgbClr val="FF0000"/>
-                </a:solidFill>
-              </a:rPr>
-              <a:t>Calibration weighting adjustments</a:t>
-            </a:r>
-          </a:p>
-          <a:p>
-            <a:pPr lvl="1"/>
-            <a:r>
-              <a:rPr lang="en-US" dirty="0" smtClean="0"/>
-              <a:t>Propensity model</a:t>
-            </a:r>
-            <a:endParaRPr lang="en-US" dirty="0"/>
-          </a:p>
-          <a:p>
-            <a:pPr marL="350838" lvl="1" indent="0">
-              <a:buNone/>
-            </a:pPr>
-            <a:endParaRPr lang="en-US" dirty="0"/>
-          </a:p>
-        </p:txBody>
-      </p:sp>
-    </p:spTree>
-    <p:extLst>
-      <p:ext uri="{BB962C8B-B14F-4D97-AF65-F5344CB8AC3E}">
-        <p14:creationId xmlns:p14="http://schemas.microsoft.com/office/powerpoint/2010/main" val="291710496"/>
-      </p:ext>
-    </p:extLst>
-  </p:cSld>
-  <p:clrMapOvr>
-    <a:masterClrMapping/>
-  </p:clrMapOvr>
-</p:sld>
-</file>
-
-<file path=ppt/slides/slide6.xml><?xml version="1.0" encoding="utf-8"?>
-<p:sld xmlns:a="http://schemas.openxmlformats.org/drawingml/2006/main" xmlns:r="http://schemas.openxmlformats.org/officeDocument/2006/relationships" xmlns:p="http://schemas.openxmlformats.org/presentationml/2006/main">
-  <p:cSld>
-    <p:spTree>
-      <p:nvGrpSpPr>
-        <p:cNvPr id="1" name=""/>
-        <p:cNvGrpSpPr/>
-        <p:nvPr/>
-      </p:nvGrpSpPr>
-      <p:grpSpPr>
-        <a:xfrm>
-          <a:off x="0" y="0"/>
-          <a:ext cx="0" cy="0"/>
-          <a:chOff x="0" y="0"/>
-          <a:chExt cx="0" cy="0"/>
-        </a:xfrm>
-      </p:grpSpPr>
-      <p:sp>
-        <p:nvSpPr>
-          <p:cNvPr id="2" name="Title 1"/>
-          <p:cNvSpPr>
-            <a:spLocks noGrp="1"/>
-          </p:cNvSpPr>
-          <p:nvPr>
-            <p:ph type="title"/>
-          </p:nvPr>
-        </p:nvSpPr>
-        <p:spPr/>
-        <p:txBody>
-          <a:bodyPr>
-            <a:normAutofit/>
-          </a:bodyPr>
-          <a:lstStyle/>
-          <a:p>
-            <a:r>
-              <a:rPr lang="en-US" sz="2800" dirty="0" smtClean="0"/>
-              <a:t>4 approaches to mitigate nonresponse bias</a:t>
-            </a:r>
-            <a:endParaRPr lang="en-US" sz="2800" dirty="0"/>
-          </a:p>
-        </p:txBody>
-      </p:sp>
-      <p:sp>
-        <p:nvSpPr>
-          <p:cNvPr id="3" name="Content Placeholder 2"/>
-          <p:cNvSpPr>
-            <a:spLocks noGrp="1"/>
-          </p:cNvSpPr>
-          <p:nvPr>
-            <p:ph idx="1"/>
-          </p:nvPr>
-        </p:nvSpPr>
-        <p:spPr/>
-        <p:txBody>
-          <a:bodyPr/>
-          <a:lstStyle/>
-          <a:p>
-            <a:pPr marL="693738" lvl="1" indent="-457200"/>
-            <a:endParaRPr lang="en-US" dirty="0" smtClean="0"/>
-          </a:p>
-        </p:txBody>
-      </p:sp>
-    </p:spTree>
-    <p:extLst>
-      <p:ext uri="{BB962C8B-B14F-4D97-AF65-F5344CB8AC3E}">
-        <p14:creationId xmlns:p14="http://schemas.microsoft.com/office/powerpoint/2010/main" val="2255590458"/>
-      </p:ext>
-    </p:extLst>
-  </p:cSld>
-  <p:clrMapOvr>
-    <a:masterClrMapping/>
-  </p:clrMapOvr>
-  <p:timing>
-    <p:tnLst>
-      <p:par>
-        <p:cTn xmlns:p14="http://schemas.microsoft.com/office/powerpoint/2010/main" id="1" dur="indefinite" restart="never" nodeType="tmRoot"/>
-      </p:par>
-    </p:tnLst>
-  </p:timing>
-</p:sld>
-</file>
-
-<file path=ppt/slides/slide7.xml><?xml version="1.0" encoding="utf-8"?>
-<p:sld xmlns:a="http://schemas.openxmlformats.org/drawingml/2006/main" xmlns:r="http://schemas.openxmlformats.org/officeDocument/2006/relationships" xmlns:p="http://schemas.openxmlformats.org/presentationml/2006/main">
-  <p:cSld>
-    <p:spTree>
-      <p:nvGrpSpPr>
-        <p:cNvPr id="1" name=""/>
-        <p:cNvGrpSpPr/>
-        <p:nvPr/>
-      </p:nvGrpSpPr>
-      <p:grpSpPr>
-        <a:xfrm>
-          <a:off x="0" y="0"/>
-          <a:ext cx="0" cy="0"/>
-          <a:chOff x="0" y="0"/>
-          <a:chExt cx="0" cy="0"/>
-        </a:xfrm>
-      </p:grpSpPr>
-      <p:sp>
-        <p:nvSpPr>
-          <p:cNvPr id="2" name="Title 1"/>
-          <p:cNvSpPr>
-            <a:spLocks noGrp="1"/>
-          </p:cNvSpPr>
-          <p:nvPr>
-            <p:ph type="title"/>
-          </p:nvPr>
-        </p:nvSpPr>
-        <p:spPr/>
-        <p:txBody>
-          <a:bodyPr>
-            <a:normAutofit fontScale="90000"/>
-          </a:bodyPr>
-          <a:lstStyle/>
-          <a:p>
-            <a:r>
-              <a:rPr lang="en-US" dirty="0" smtClean="0"/>
-              <a:t>Random and convenient sampling</a:t>
-            </a:r>
-            <a:endParaRPr lang="en-US" dirty="0"/>
-          </a:p>
-        </p:txBody>
-      </p:sp>
-      <p:sp>
-        <p:nvSpPr>
-          <p:cNvPr id="3" name="Content Placeholder 2"/>
-          <p:cNvSpPr>
-            <a:spLocks noGrp="1"/>
-          </p:cNvSpPr>
-          <p:nvPr>
-            <p:ph idx="1"/>
-          </p:nvPr>
-        </p:nvSpPr>
-        <p:spPr>
-          <a:xfrm>
-            <a:off x="900112" y="2133601"/>
-            <a:ext cx="7930808" cy="1852446"/>
-          </a:xfrm>
-        </p:spPr>
-        <p:txBody>
-          <a:bodyPr>
-            <a:normAutofit fontScale="92500" lnSpcReduction="20000"/>
-          </a:bodyPr>
-          <a:lstStyle/>
-          <a:p>
-            <a:r>
-              <a:rPr lang="en-US" dirty="0" smtClean="0"/>
-              <a:t>Random </a:t>
-            </a:r>
-            <a:r>
-              <a:rPr lang="mr-IN" dirty="0" smtClean="0"/>
-              <a:t>–</a:t>
-            </a:r>
-            <a:r>
-              <a:rPr lang="en-US" dirty="0" smtClean="0"/>
-              <a:t> survey a sub-population selected at random</a:t>
-            </a:r>
-          </a:p>
-          <a:p>
-            <a:endParaRPr lang="en-US" dirty="0"/>
-          </a:p>
-          <a:p>
-            <a:r>
-              <a:rPr lang="en-US" dirty="0" smtClean="0"/>
-              <a:t>Convenient </a:t>
-            </a:r>
-            <a:r>
-              <a:rPr lang="mr-IN" dirty="0" smtClean="0"/>
-              <a:t>–</a:t>
-            </a:r>
-            <a:r>
-              <a:rPr lang="en-US" dirty="0" smtClean="0"/>
-              <a:t> sample people who are easy to reach</a:t>
-            </a:r>
-          </a:p>
-          <a:p>
-            <a:pPr lvl="1"/>
-            <a:r>
-              <a:rPr lang="en-US" dirty="0" smtClean="0"/>
-              <a:t>E.g. volunteer sampling</a:t>
-            </a:r>
-            <a:endParaRPr lang="en-US" dirty="0"/>
-          </a:p>
-        </p:txBody>
-      </p:sp>
-    </p:spTree>
-    <p:extLst>
-      <p:ext uri="{BB962C8B-B14F-4D97-AF65-F5344CB8AC3E}">
-        <p14:creationId xmlns:p14="http://schemas.microsoft.com/office/powerpoint/2010/main" val="2051937309"/>
       </p:ext>
     </p:extLst>
   </p:cSld>

</xml_diff>